<commit_message>
Futher changes to NSGP poster
</commit_message>
<xml_diff>
--- a/RampV03Presentation.pptx
+++ b/RampV03Presentation.pptx
@@ -25,6 +25,7 @@
     <p:sldId id="273" r:id="rId19"/>
     <p:sldId id="276" r:id="rId20"/>
     <p:sldId id="275" r:id="rId21"/>
+    <p:sldId id="277" r:id="rId22"/>
   </p:sldIdLst>
   <p:sldSz cx="12192000" cy="6858000"/>
   <p:notesSz cx="6858000" cy="9144000"/>
@@ -278,7 +279,7 @@
           <a:p>
             <a:fld id="{F1EB54BA-186C-4A9E-B622-D29CC351A41F}" type="datetimeFigureOut">
               <a:rPr lang="en-US" smtClean="0"/>
-              <a:t>10/11/2018</a:t>
+              <a:t>10/13/2018</a:t>
             </a:fld>
             <a:endParaRPr lang="en-US"/>
           </a:p>
@@ -476,7 +477,7 @@
           <a:p>
             <a:fld id="{F1EB54BA-186C-4A9E-B622-D29CC351A41F}" type="datetimeFigureOut">
               <a:rPr lang="en-US" smtClean="0"/>
-              <a:t>10/11/2018</a:t>
+              <a:t>10/13/2018</a:t>
             </a:fld>
             <a:endParaRPr lang="en-US"/>
           </a:p>
@@ -684,7 +685,7 @@
           <a:p>
             <a:fld id="{F1EB54BA-186C-4A9E-B622-D29CC351A41F}" type="datetimeFigureOut">
               <a:rPr lang="en-US" smtClean="0"/>
-              <a:t>10/11/2018</a:t>
+              <a:t>10/13/2018</a:t>
             </a:fld>
             <a:endParaRPr lang="en-US"/>
           </a:p>
@@ -882,7 +883,7 @@
           <a:p>
             <a:fld id="{F1EB54BA-186C-4A9E-B622-D29CC351A41F}" type="datetimeFigureOut">
               <a:rPr lang="en-US" smtClean="0"/>
-              <a:t>10/11/2018</a:t>
+              <a:t>10/13/2018</a:t>
             </a:fld>
             <a:endParaRPr lang="en-US"/>
           </a:p>
@@ -1157,7 +1158,7 @@
           <a:p>
             <a:fld id="{F1EB54BA-186C-4A9E-B622-D29CC351A41F}" type="datetimeFigureOut">
               <a:rPr lang="en-US" smtClean="0"/>
-              <a:t>10/11/2018</a:t>
+              <a:t>10/13/2018</a:t>
             </a:fld>
             <a:endParaRPr lang="en-US"/>
           </a:p>
@@ -1422,7 +1423,7 @@
           <a:p>
             <a:fld id="{F1EB54BA-186C-4A9E-B622-D29CC351A41F}" type="datetimeFigureOut">
               <a:rPr lang="en-US" smtClean="0"/>
-              <a:t>10/11/2018</a:t>
+              <a:t>10/13/2018</a:t>
             </a:fld>
             <a:endParaRPr lang="en-US"/>
           </a:p>
@@ -1834,7 +1835,7 @@
           <a:p>
             <a:fld id="{F1EB54BA-186C-4A9E-B622-D29CC351A41F}" type="datetimeFigureOut">
               <a:rPr lang="en-US" smtClean="0"/>
-              <a:t>10/11/2018</a:t>
+              <a:t>10/13/2018</a:t>
             </a:fld>
             <a:endParaRPr lang="en-US"/>
           </a:p>
@@ -1975,7 +1976,7 @@
           <a:p>
             <a:fld id="{F1EB54BA-186C-4A9E-B622-D29CC351A41F}" type="datetimeFigureOut">
               <a:rPr lang="en-US" smtClean="0"/>
-              <a:t>10/11/2018</a:t>
+              <a:t>10/13/2018</a:t>
             </a:fld>
             <a:endParaRPr lang="en-US"/>
           </a:p>
@@ -2088,7 +2089,7 @@
           <a:p>
             <a:fld id="{F1EB54BA-186C-4A9E-B622-D29CC351A41F}" type="datetimeFigureOut">
               <a:rPr lang="en-US" smtClean="0"/>
-              <a:t>10/11/2018</a:t>
+              <a:t>10/13/2018</a:t>
             </a:fld>
             <a:endParaRPr lang="en-US"/>
           </a:p>
@@ -2399,7 +2400,7 @@
           <a:p>
             <a:fld id="{F1EB54BA-186C-4A9E-B622-D29CC351A41F}" type="datetimeFigureOut">
               <a:rPr lang="en-US" smtClean="0"/>
-              <a:t>10/11/2018</a:t>
+              <a:t>10/13/2018</a:t>
             </a:fld>
             <a:endParaRPr lang="en-US"/>
           </a:p>
@@ -2687,7 +2688,7 @@
           <a:p>
             <a:fld id="{F1EB54BA-186C-4A9E-B622-D29CC351A41F}" type="datetimeFigureOut">
               <a:rPr lang="en-US" smtClean="0"/>
-              <a:t>10/11/2018</a:t>
+              <a:t>10/13/2018</a:t>
             </a:fld>
             <a:endParaRPr lang="en-US"/>
           </a:p>
@@ -2928,7 +2929,7 @@
           <a:p>
             <a:fld id="{F1EB54BA-186C-4A9E-B622-D29CC351A41F}" type="datetimeFigureOut">
               <a:rPr lang="en-US" smtClean="0"/>
-              <a:t>10/11/2018</a:t>
+              <a:t>10/13/2018</a:t>
             </a:fld>
             <a:endParaRPr lang="en-US"/>
           </a:p>
@@ -6513,6 +6514,457 @@
 </p:sld>
 </file>
 
+<file path=ppt/slides/slide21.xml><?xml version="1.0" encoding="utf-8"?>
+<p:sld xmlns:a="http://schemas.openxmlformats.org/drawingml/2006/main" xmlns:r="http://schemas.openxmlformats.org/officeDocument/2006/relationships" xmlns:p="http://schemas.openxmlformats.org/presentationml/2006/main">
+  <p:cSld>
+    <p:spTree>
+      <p:nvGrpSpPr>
+        <p:cNvPr id="1" name=""/>
+        <p:cNvGrpSpPr/>
+        <p:nvPr/>
+      </p:nvGrpSpPr>
+      <p:grpSpPr>
+        <a:xfrm>
+          <a:off x="0" y="0"/>
+          <a:ext cx="0" cy="0"/>
+          <a:chOff x="0" y="0"/>
+          <a:chExt cx="0" cy="0"/>
+        </a:xfrm>
+      </p:grpSpPr>
+      <p:sp>
+        <p:nvSpPr>
+          <p:cNvPr id="5" name="TextBox 4">
+            <a:extLst>
+              <a:ext uri="{FF2B5EF4-FFF2-40B4-BE49-F238E27FC236}">
+                <a16:creationId xmlns:a16="http://schemas.microsoft.com/office/drawing/2014/main" id="{B2AEFC80-A8E7-4716-838A-99F2DC092252}"/>
+              </a:ext>
+            </a:extLst>
+          </p:cNvPr>
+          <p:cNvSpPr txBox="1"/>
+          <p:nvPr/>
+        </p:nvSpPr>
+        <p:spPr>
+          <a:xfrm flipH="1">
+            <a:off x="3774380" y="1450943"/>
+            <a:ext cx="780432" cy="369332"/>
+          </a:xfrm>
+          <a:prstGeom prst="rect">
+            <a:avLst/>
+          </a:prstGeom>
+          <a:noFill/>
+        </p:spPr>
+        <p:txBody>
+          <a:bodyPr wrap="square" rtlCol="0">
+            <a:spAutoFit/>
+          </a:bodyPr>
+          <a:lstStyle/>
+          <a:p>
+            <a:r>
+              <a:rPr lang="en-US" dirty="0"/>
+              <a:t>Low</a:t>
+            </a:r>
+          </a:p>
+        </p:txBody>
+      </p:sp>
+      <p:sp>
+        <p:nvSpPr>
+          <p:cNvPr id="6" name="TextBox 5">
+            <a:extLst>
+              <a:ext uri="{FF2B5EF4-FFF2-40B4-BE49-F238E27FC236}">
+                <a16:creationId xmlns:a16="http://schemas.microsoft.com/office/drawing/2014/main" id="{D25E95B3-038A-49C0-A169-D2789174293C}"/>
+              </a:ext>
+            </a:extLst>
+          </p:cNvPr>
+          <p:cNvSpPr txBox="1"/>
+          <p:nvPr/>
+        </p:nvSpPr>
+        <p:spPr>
+          <a:xfrm flipH="1">
+            <a:off x="3774380" y="3344935"/>
+            <a:ext cx="780432" cy="369332"/>
+          </a:xfrm>
+          <a:prstGeom prst="rect">
+            <a:avLst/>
+          </a:prstGeom>
+          <a:noFill/>
+        </p:spPr>
+        <p:txBody>
+          <a:bodyPr wrap="square" rtlCol="0">
+            <a:spAutoFit/>
+          </a:bodyPr>
+          <a:lstStyle/>
+          <a:p>
+            <a:r>
+              <a:rPr lang="en-US" dirty="0"/>
+              <a:t>Mid</a:t>
+            </a:r>
+          </a:p>
+        </p:txBody>
+      </p:sp>
+      <p:sp>
+        <p:nvSpPr>
+          <p:cNvPr id="7" name="TextBox 6">
+            <a:extLst>
+              <a:ext uri="{FF2B5EF4-FFF2-40B4-BE49-F238E27FC236}">
+                <a16:creationId xmlns:a16="http://schemas.microsoft.com/office/drawing/2014/main" id="{FBD68DEE-CC29-4C5F-9CA3-2F68FBE781C8}"/>
+              </a:ext>
+            </a:extLst>
+          </p:cNvPr>
+          <p:cNvSpPr txBox="1"/>
+          <p:nvPr/>
+        </p:nvSpPr>
+        <p:spPr>
+          <a:xfrm flipH="1">
+            <a:off x="3837447" y="5238927"/>
+            <a:ext cx="780432" cy="369332"/>
+          </a:xfrm>
+          <a:prstGeom prst="rect">
+            <a:avLst/>
+          </a:prstGeom>
+          <a:noFill/>
+        </p:spPr>
+        <p:txBody>
+          <a:bodyPr wrap="square" rtlCol="0">
+            <a:spAutoFit/>
+          </a:bodyPr>
+          <a:lstStyle/>
+          <a:p>
+            <a:r>
+              <a:rPr lang="en-US" dirty="0"/>
+              <a:t>High</a:t>
+            </a:r>
+          </a:p>
+        </p:txBody>
+      </p:sp>
+      <p:sp>
+        <p:nvSpPr>
+          <p:cNvPr id="8" name="TextBox 7">
+            <a:extLst>
+              <a:ext uri="{FF2B5EF4-FFF2-40B4-BE49-F238E27FC236}">
+                <a16:creationId xmlns:a16="http://schemas.microsoft.com/office/drawing/2014/main" id="{131F4AE3-D74F-4DB2-92C2-3995FD792572}"/>
+              </a:ext>
+            </a:extLst>
+          </p:cNvPr>
+          <p:cNvSpPr txBox="1"/>
+          <p:nvPr/>
+        </p:nvSpPr>
+        <p:spPr>
+          <a:xfrm flipH="1">
+            <a:off x="5771465" y="-13444"/>
+            <a:ext cx="780432" cy="369332"/>
+          </a:xfrm>
+          <a:prstGeom prst="rect">
+            <a:avLst/>
+          </a:prstGeom>
+          <a:noFill/>
+        </p:spPr>
+        <p:txBody>
+          <a:bodyPr wrap="square" rtlCol="0">
+            <a:spAutoFit/>
+          </a:bodyPr>
+          <a:lstStyle/>
+          <a:p>
+            <a:r>
+              <a:rPr lang="en-US" dirty="0"/>
+              <a:t>Mag</a:t>
+            </a:r>
+          </a:p>
+        </p:txBody>
+      </p:sp>
+      <p:sp>
+        <p:nvSpPr>
+          <p:cNvPr id="9" name="TextBox 8">
+            <a:extLst>
+              <a:ext uri="{FF2B5EF4-FFF2-40B4-BE49-F238E27FC236}">
+                <a16:creationId xmlns:a16="http://schemas.microsoft.com/office/drawing/2014/main" id="{6440C8A3-D846-4F76-91C1-392A37029662}"/>
+              </a:ext>
+            </a:extLst>
+          </p:cNvPr>
+          <p:cNvSpPr txBox="1"/>
+          <p:nvPr/>
+        </p:nvSpPr>
+        <p:spPr>
+          <a:xfrm flipH="1">
+            <a:off x="9122380" y="-13444"/>
+            <a:ext cx="780432" cy="369332"/>
+          </a:xfrm>
+          <a:prstGeom prst="rect">
+            <a:avLst/>
+          </a:prstGeom>
+          <a:noFill/>
+        </p:spPr>
+        <p:txBody>
+          <a:bodyPr wrap="square" rtlCol="0">
+            <a:spAutoFit/>
+          </a:bodyPr>
+          <a:lstStyle/>
+          <a:p>
+            <a:r>
+              <a:rPr lang="en-US" dirty="0"/>
+              <a:t>Value</a:t>
+            </a:r>
+          </a:p>
+        </p:txBody>
+      </p:sp>
+      <p:sp>
+        <p:nvSpPr>
+          <p:cNvPr id="11" name="TextBox 10">
+            <a:extLst>
+              <a:ext uri="{FF2B5EF4-FFF2-40B4-BE49-F238E27FC236}">
+                <a16:creationId xmlns:a16="http://schemas.microsoft.com/office/drawing/2014/main" id="{E9DD2401-8DF1-4267-AAB9-43229D05FC1B}"/>
+              </a:ext>
+            </a:extLst>
+          </p:cNvPr>
+          <p:cNvSpPr txBox="1"/>
+          <p:nvPr/>
+        </p:nvSpPr>
+        <p:spPr>
+          <a:xfrm>
+            <a:off x="1489950" y="3714267"/>
+            <a:ext cx="1088824" cy="369332"/>
+          </a:xfrm>
+          <a:prstGeom prst="rect">
+            <a:avLst/>
+          </a:prstGeom>
+          <a:noFill/>
+        </p:spPr>
+        <p:txBody>
+          <a:bodyPr wrap="none" rtlCol="0">
+            <a:spAutoFit/>
+          </a:bodyPr>
+          <a:lstStyle/>
+          <a:p>
+            <a:r>
+              <a:rPr lang="en-US" dirty="0" err="1"/>
+              <a:t>EveryTrial</a:t>
+            </a:r>
+            <a:endParaRPr lang="en-US" dirty="0"/>
+          </a:p>
+        </p:txBody>
+      </p:sp>
+      <p:pic>
+        <p:nvPicPr>
+          <p:cNvPr id="18" name="Picture 17">
+            <a:extLst>
+              <a:ext uri="{FF2B5EF4-FFF2-40B4-BE49-F238E27FC236}">
+                <a16:creationId xmlns:a16="http://schemas.microsoft.com/office/drawing/2014/main" id="{F716B065-EAE6-47C3-9ED7-757245206B52}"/>
+              </a:ext>
+            </a:extLst>
+          </p:cNvPr>
+          <p:cNvPicPr>
+            <a:picLocks noChangeAspect="1"/>
+          </p:cNvPicPr>
+          <p:nvPr/>
+        </p:nvPicPr>
+        <p:blipFill>
+          <a:blip r:embed="rId2"/>
+          <a:stretch>
+            <a:fillRect/>
+          </a:stretch>
+        </p:blipFill>
+        <p:spPr>
+          <a:xfrm>
+            <a:off x="145103" y="4095021"/>
+            <a:ext cx="3680953" cy="2657143"/>
+          </a:xfrm>
+          <a:prstGeom prst="rect">
+            <a:avLst/>
+          </a:prstGeom>
+        </p:spPr>
+      </p:pic>
+      <p:pic>
+        <p:nvPicPr>
+          <p:cNvPr id="19" name="Picture 18">
+            <a:extLst>
+              <a:ext uri="{FF2B5EF4-FFF2-40B4-BE49-F238E27FC236}">
+                <a16:creationId xmlns:a16="http://schemas.microsoft.com/office/drawing/2014/main" id="{C85DB884-D650-4732-A5BF-59F157442C0E}"/>
+              </a:ext>
+            </a:extLst>
+          </p:cNvPr>
+          <p:cNvPicPr>
+            <a:picLocks noChangeAspect="1"/>
+          </p:cNvPicPr>
+          <p:nvPr/>
+        </p:nvPicPr>
+        <p:blipFill>
+          <a:blip r:embed="rId3"/>
+          <a:stretch>
+            <a:fillRect/>
+          </a:stretch>
+        </p:blipFill>
+        <p:spPr>
+          <a:xfrm>
+            <a:off x="4500030" y="319219"/>
+            <a:ext cx="3191939" cy="2304142"/>
+          </a:xfrm>
+          <a:prstGeom prst="rect">
+            <a:avLst/>
+          </a:prstGeom>
+        </p:spPr>
+      </p:pic>
+      <p:pic>
+        <p:nvPicPr>
+          <p:cNvPr id="20" name="Picture 19">
+            <a:extLst>
+              <a:ext uri="{FF2B5EF4-FFF2-40B4-BE49-F238E27FC236}">
+                <a16:creationId xmlns:a16="http://schemas.microsoft.com/office/drawing/2014/main" id="{BC1430AA-875B-4249-96AE-5636B95366FA}"/>
+              </a:ext>
+            </a:extLst>
+          </p:cNvPr>
+          <p:cNvPicPr>
+            <a:picLocks noChangeAspect="1"/>
+          </p:cNvPicPr>
+          <p:nvPr/>
+        </p:nvPicPr>
+        <p:blipFill>
+          <a:blip r:embed="rId4"/>
+          <a:stretch>
+            <a:fillRect/>
+          </a:stretch>
+        </p:blipFill>
+        <p:spPr>
+          <a:xfrm>
+            <a:off x="4632056" y="2623361"/>
+            <a:ext cx="2943762" cy="2124993"/>
+          </a:xfrm>
+          <a:prstGeom prst="rect">
+            <a:avLst/>
+          </a:prstGeom>
+        </p:spPr>
+      </p:pic>
+      <p:pic>
+        <p:nvPicPr>
+          <p:cNvPr id="23" name="Picture 22">
+            <a:extLst>
+              <a:ext uri="{FF2B5EF4-FFF2-40B4-BE49-F238E27FC236}">
+                <a16:creationId xmlns:a16="http://schemas.microsoft.com/office/drawing/2014/main" id="{3A3834FA-D6A9-4E46-94DF-9630738EACD9}"/>
+              </a:ext>
+            </a:extLst>
+          </p:cNvPr>
+          <p:cNvPicPr>
+            <a:picLocks noChangeAspect="1"/>
+          </p:cNvPicPr>
+          <p:nvPr/>
+        </p:nvPicPr>
+        <p:blipFill>
+          <a:blip r:embed="rId5"/>
+          <a:stretch>
+            <a:fillRect/>
+          </a:stretch>
+        </p:blipFill>
+        <p:spPr>
+          <a:xfrm>
+            <a:off x="4695123" y="4748354"/>
+            <a:ext cx="2829542" cy="2042541"/>
+          </a:xfrm>
+          <a:prstGeom prst="rect">
+            <a:avLst/>
+          </a:prstGeom>
+        </p:spPr>
+      </p:pic>
+      <p:pic>
+        <p:nvPicPr>
+          <p:cNvPr id="25" name="Picture 24">
+            <a:extLst>
+              <a:ext uri="{FF2B5EF4-FFF2-40B4-BE49-F238E27FC236}">
+                <a16:creationId xmlns:a16="http://schemas.microsoft.com/office/drawing/2014/main" id="{9C198736-EA3A-48BD-A209-1A219C94F743}"/>
+              </a:ext>
+            </a:extLst>
+          </p:cNvPr>
+          <p:cNvPicPr>
+            <a:picLocks noChangeAspect="1"/>
+          </p:cNvPicPr>
+          <p:nvPr/>
+        </p:nvPicPr>
+        <p:blipFill>
+          <a:blip r:embed="rId6"/>
+          <a:stretch>
+            <a:fillRect/>
+          </a:stretch>
+        </p:blipFill>
+        <p:spPr>
+          <a:xfrm>
+            <a:off x="7918069" y="342592"/>
+            <a:ext cx="3033466" cy="2189746"/>
+          </a:xfrm>
+          <a:prstGeom prst="rect">
+            <a:avLst/>
+          </a:prstGeom>
+        </p:spPr>
+      </p:pic>
+      <p:pic>
+        <p:nvPicPr>
+          <p:cNvPr id="26" name="Picture 25">
+            <a:extLst>
+              <a:ext uri="{FF2B5EF4-FFF2-40B4-BE49-F238E27FC236}">
+                <a16:creationId xmlns:a16="http://schemas.microsoft.com/office/drawing/2014/main" id="{09F81DE1-9C55-49F0-A62A-3490D478B548}"/>
+              </a:ext>
+            </a:extLst>
+          </p:cNvPr>
+          <p:cNvPicPr>
+            <a:picLocks noChangeAspect="1"/>
+          </p:cNvPicPr>
+          <p:nvPr/>
+        </p:nvPicPr>
+        <p:blipFill>
+          <a:blip r:embed="rId7"/>
+          <a:stretch>
+            <a:fillRect/>
+          </a:stretch>
+        </p:blipFill>
+        <p:spPr>
+          <a:xfrm>
+            <a:off x="8005315" y="2623360"/>
+            <a:ext cx="2943762" cy="2124993"/>
+          </a:xfrm>
+          <a:prstGeom prst="rect">
+            <a:avLst/>
+          </a:prstGeom>
+        </p:spPr>
+      </p:pic>
+      <p:pic>
+        <p:nvPicPr>
+          <p:cNvPr id="27" name="Picture 26">
+            <a:extLst>
+              <a:ext uri="{FF2B5EF4-FFF2-40B4-BE49-F238E27FC236}">
+                <a16:creationId xmlns:a16="http://schemas.microsoft.com/office/drawing/2014/main" id="{E314216B-CC80-4067-ADED-CFDBFAD932DF}"/>
+              </a:ext>
+            </a:extLst>
+          </p:cNvPr>
+          <p:cNvPicPr>
+            <a:picLocks noChangeAspect="1"/>
+          </p:cNvPicPr>
+          <p:nvPr/>
+        </p:nvPicPr>
+        <p:blipFill>
+          <a:blip r:embed="rId8"/>
+          <a:stretch>
+            <a:fillRect/>
+          </a:stretch>
+        </p:blipFill>
+        <p:spPr>
+          <a:xfrm>
+            <a:off x="8040715" y="4692068"/>
+            <a:ext cx="2943762" cy="2124993"/>
+          </a:xfrm>
+          <a:prstGeom prst="rect">
+            <a:avLst/>
+          </a:prstGeom>
+        </p:spPr>
+      </p:pic>
+    </p:spTree>
+    <p:extLst>
+      <p:ext uri="{BB962C8B-B14F-4D97-AF65-F5344CB8AC3E}">
+        <p14:creationId xmlns:p14="http://schemas.microsoft.com/office/powerpoint/2010/main" val="2316988597"/>
+      </p:ext>
+    </p:extLst>
+  </p:cSld>
+  <p:clrMapOvr>
+    <a:masterClrMapping/>
+  </p:clrMapOvr>
+</p:sld>
+</file>
+
 <file path=ppt/slides/slide3.xml><?xml version="1.0" encoding="utf-8"?>
 <p:sld xmlns:a="http://schemas.openxmlformats.org/drawingml/2006/main" xmlns:r="http://schemas.openxmlformats.org/officeDocument/2006/relationships" xmlns:p="http://schemas.openxmlformats.org/presentationml/2006/main">
   <p:cSld>

</xml_diff>